<commit_message>
added some mor einfo
</commit_message>
<xml_diff>
--- a/docs/masking_tests_17Jan2017.pptx
+++ b/docs/masking_tests_17Jan2017.pptx
@@ -8,6 +8,7 @@
     <p:sldId id="256" r:id="rId2"/>
     <p:sldId id="274" r:id="rId3"/>
     <p:sldId id="275" r:id="rId4"/>
+    <p:sldId id="276" r:id="rId5"/>
   </p:sldIdLst>
   <p:sldSz cx="12192000" cy="6858000"/>
   <p:notesSz cx="6858000" cy="9144000"/>
@@ -3148,13 +3149,8 @@
             <a:pPr lvl="1"/>
             <a:r>
               <a:rPr lang="en-NZ" dirty="0" smtClean="0"/>
-              <a:t>Target point is valid only if it is inside the </a:t>
-            </a:r>
-            <a:r>
-              <a:rPr lang="en-NZ" smtClean="0"/>
-              <a:t>valid triangle</a:t>
-            </a:r>
-            <a:endParaRPr lang="en-NZ" dirty="0" smtClean="0"/>
+              <a:t>Target point is valid only if it is inside the valid triangle (see next slide)</a:t>
+            </a:r>
           </a:p>
           <a:p>
             <a:r>
@@ -3922,6 +3918,446 @@
     <p:extLst>
       <p:ext uri="{BB962C8B-B14F-4D97-AF65-F5344CB8AC3E}">
         <p14:creationId xmlns:p14="http://schemas.microsoft.com/office/powerpoint/2010/main" val="2285242343"/>
+      </p:ext>
+    </p:extLst>
+  </p:cSld>
+  <p:clrMapOvr>
+    <a:masterClrMapping/>
+  </p:clrMapOvr>
+</p:sld>
+</file>
+
+<file path=ppt/slides/slide4.xml><?xml version="1.0" encoding="utf-8"?>
+<p:sld xmlns:a="http://schemas.openxmlformats.org/drawingml/2006/main" xmlns:r="http://schemas.openxmlformats.org/officeDocument/2006/relationships" xmlns:p="http://schemas.openxmlformats.org/presentationml/2006/main">
+  <p:cSld>
+    <p:spTree>
+      <p:nvGrpSpPr>
+        <p:cNvPr id="1" name=""/>
+        <p:cNvGrpSpPr/>
+        <p:nvPr/>
+      </p:nvGrpSpPr>
+      <p:grpSpPr>
+        <a:xfrm>
+          <a:off x="0" y="0"/>
+          <a:ext cx="0" cy="0"/>
+          <a:chOff x="0" y="0"/>
+          <a:chExt cx="0" cy="0"/>
+        </a:xfrm>
+      </p:grpSpPr>
+      <p:sp>
+        <p:nvSpPr>
+          <p:cNvPr id="2" name="Title 1"/>
+          <p:cNvSpPr>
+            <a:spLocks noGrp="1"/>
+          </p:cNvSpPr>
+          <p:nvPr>
+            <p:ph type="title"/>
+          </p:nvPr>
+        </p:nvSpPr>
+        <p:spPr/>
+        <p:txBody>
+          <a:bodyPr/>
+          <a:lstStyle/>
+          <a:p>
+            <a:r>
+              <a:rPr lang="en-NZ" dirty="0" smtClean="0"/>
+              <a:t>Triangle interpolation formula</a:t>
+            </a:r>
+            <a:endParaRPr lang="en-NZ" dirty="0"/>
+          </a:p>
+        </p:txBody>
+      </p:sp>
+      <p:sp>
+        <p:nvSpPr>
+          <p:cNvPr id="3" name="Content Placeholder 2"/>
+          <p:cNvSpPr>
+            <a:spLocks noGrp="1"/>
+          </p:cNvSpPr>
+          <p:nvPr>
+            <p:ph idx="1"/>
+          </p:nvPr>
+        </p:nvSpPr>
+        <p:spPr/>
+        <p:txBody>
+          <a:bodyPr/>
+          <a:lstStyle/>
+          <a:p>
+            <a:r>
+              <a:rPr lang="en-NZ" dirty="0" smtClean="0"/>
+              <a:t>f = f0 w0 + f1 w1 + f2 w2</a:t>
+            </a:r>
+            <a:endParaRPr lang="en-NZ" dirty="0"/>
+          </a:p>
+          <a:p>
+            <a:pPr marL="0" indent="0">
+              <a:buNone/>
+            </a:pPr>
+            <a:r>
+              <a:rPr lang="en-NZ" dirty="0" smtClean="0"/>
+              <a:t> </a:t>
+            </a:r>
+            <a:endParaRPr lang="en-NZ" dirty="0"/>
+          </a:p>
+        </p:txBody>
+      </p:sp>
+      <p:sp>
+        <p:nvSpPr>
+          <p:cNvPr id="4" name="Isosceles Triangle 3"/>
+          <p:cNvSpPr/>
+          <p:nvPr/>
+        </p:nvSpPr>
+        <p:spPr>
+          <a:xfrm>
+            <a:off x="4472609" y="2557669"/>
+            <a:ext cx="3246782" cy="2266122"/>
+          </a:xfrm>
+          <a:prstGeom prst="triangle">
+            <a:avLst/>
+          </a:prstGeom>
+          <a:noFill/>
+        </p:spPr>
+        <p:style>
+          <a:lnRef idx="2">
+            <a:schemeClr val="accent1">
+              <a:shade val="50000"/>
+            </a:schemeClr>
+          </a:lnRef>
+          <a:fillRef idx="1">
+            <a:schemeClr val="accent1"/>
+          </a:fillRef>
+          <a:effectRef idx="0">
+            <a:schemeClr val="accent1"/>
+          </a:effectRef>
+          <a:fontRef idx="minor">
+            <a:schemeClr val="lt1"/>
+          </a:fontRef>
+        </p:style>
+        <p:txBody>
+          <a:bodyPr rtlCol="0" anchor="ctr"/>
+          <a:lstStyle/>
+          <a:p>
+            <a:pPr algn="ctr"/>
+            <a:endParaRPr lang="en-NZ"/>
+          </a:p>
+        </p:txBody>
+      </p:sp>
+      <p:sp>
+        <p:nvSpPr>
+          <p:cNvPr id="5" name="TextBox 4"/>
+          <p:cNvSpPr txBox="1"/>
+          <p:nvPr/>
+        </p:nvSpPr>
+        <p:spPr>
+          <a:xfrm>
+            <a:off x="4170923" y="4946379"/>
+            <a:ext cx="301686" cy="369332"/>
+          </a:xfrm>
+          <a:prstGeom prst="rect">
+            <a:avLst/>
+          </a:prstGeom>
+          <a:noFill/>
+        </p:spPr>
+        <p:txBody>
+          <a:bodyPr wrap="none" rtlCol="0">
+            <a:spAutoFit/>
+          </a:bodyPr>
+          <a:lstStyle/>
+          <a:p>
+            <a:r>
+              <a:rPr lang="en-NZ" dirty="0" smtClean="0"/>
+              <a:t>0</a:t>
+            </a:r>
+            <a:endParaRPr lang="en-NZ" dirty="0"/>
+          </a:p>
+        </p:txBody>
+      </p:sp>
+      <p:sp>
+        <p:nvSpPr>
+          <p:cNvPr id="6" name="Rectangle 5"/>
+          <p:cNvSpPr/>
+          <p:nvPr/>
+        </p:nvSpPr>
+        <p:spPr>
+          <a:xfrm>
+            <a:off x="7762361" y="4946379"/>
+            <a:ext cx="301686" cy="369332"/>
+          </a:xfrm>
+          <a:prstGeom prst="rect">
+            <a:avLst/>
+          </a:prstGeom>
+        </p:spPr>
+        <p:txBody>
+          <a:bodyPr wrap="none">
+            <a:spAutoFit/>
+          </a:bodyPr>
+          <a:lstStyle/>
+          <a:p>
+            <a:r>
+              <a:rPr lang="en-NZ" dirty="0" smtClean="0"/>
+              <a:t>1</a:t>
+            </a:r>
+            <a:endParaRPr lang="en-NZ" dirty="0"/>
+          </a:p>
+        </p:txBody>
+      </p:sp>
+      <p:sp>
+        <p:nvSpPr>
+          <p:cNvPr id="7" name="Rectangle 6"/>
+          <p:cNvSpPr/>
+          <p:nvPr/>
+        </p:nvSpPr>
+        <p:spPr>
+          <a:xfrm>
+            <a:off x="6096000" y="2305535"/>
+            <a:ext cx="301686" cy="369332"/>
+          </a:xfrm>
+          <a:prstGeom prst="rect">
+            <a:avLst/>
+          </a:prstGeom>
+        </p:spPr>
+        <p:txBody>
+          <a:bodyPr wrap="none">
+            <a:spAutoFit/>
+          </a:bodyPr>
+          <a:lstStyle/>
+          <a:p>
+            <a:r>
+              <a:rPr lang="en-NZ" dirty="0" smtClean="0"/>
+              <a:t>2</a:t>
+            </a:r>
+            <a:endParaRPr lang="en-NZ" dirty="0"/>
+          </a:p>
+        </p:txBody>
+      </p:sp>
+      <p:sp>
+        <p:nvSpPr>
+          <p:cNvPr id="8" name="Oval 7"/>
+          <p:cNvSpPr/>
+          <p:nvPr/>
+        </p:nvSpPr>
+        <p:spPr>
+          <a:xfrm>
+            <a:off x="6096000" y="4399722"/>
+            <a:ext cx="301686" cy="212035"/>
+          </a:xfrm>
+          <a:prstGeom prst="ellipse">
+            <a:avLst/>
+          </a:prstGeom>
+        </p:spPr>
+        <p:style>
+          <a:lnRef idx="2">
+            <a:schemeClr val="accent1">
+              <a:shade val="50000"/>
+            </a:schemeClr>
+          </a:lnRef>
+          <a:fillRef idx="1">
+            <a:schemeClr val="accent1"/>
+          </a:fillRef>
+          <a:effectRef idx="0">
+            <a:schemeClr val="accent1"/>
+          </a:effectRef>
+          <a:fontRef idx="minor">
+            <a:schemeClr val="lt1"/>
+          </a:fontRef>
+        </p:style>
+        <p:txBody>
+          <a:bodyPr rtlCol="0" anchor="ctr"/>
+          <a:lstStyle/>
+          <a:p>
+            <a:pPr algn="ctr"/>
+            <a:endParaRPr lang="en-NZ"/>
+          </a:p>
+        </p:txBody>
+      </p:sp>
+      <p:cxnSp>
+        <p:nvCxnSpPr>
+          <p:cNvPr id="10" name="Straight Connector 9"/>
+          <p:cNvCxnSpPr>
+            <a:stCxn id="4" idx="0"/>
+            <a:endCxn id="8" idx="0"/>
+          </p:cNvCxnSpPr>
+          <p:nvPr/>
+        </p:nvCxnSpPr>
+        <p:spPr>
+          <a:xfrm>
+            <a:off x="6096000" y="2557669"/>
+            <a:ext cx="150843" cy="1842053"/>
+          </a:xfrm>
+          <a:prstGeom prst="line">
+            <a:avLst/>
+          </a:prstGeom>
+        </p:spPr>
+        <p:style>
+          <a:lnRef idx="1">
+            <a:schemeClr val="accent1"/>
+          </a:lnRef>
+          <a:fillRef idx="0">
+            <a:schemeClr val="accent1"/>
+          </a:fillRef>
+          <a:effectRef idx="0">
+            <a:schemeClr val="accent1"/>
+          </a:effectRef>
+          <a:fontRef idx="minor">
+            <a:schemeClr val="tx1"/>
+          </a:fontRef>
+        </p:style>
+      </p:cxnSp>
+      <p:cxnSp>
+        <p:nvCxnSpPr>
+          <p:cNvPr id="12" name="Straight Connector 11"/>
+          <p:cNvCxnSpPr>
+            <a:stCxn id="8" idx="0"/>
+            <a:endCxn id="4" idx="4"/>
+          </p:cNvCxnSpPr>
+          <p:nvPr/>
+        </p:nvCxnSpPr>
+        <p:spPr>
+          <a:xfrm>
+            <a:off x="6246843" y="4399722"/>
+            <a:ext cx="1472548" cy="424069"/>
+          </a:xfrm>
+          <a:prstGeom prst="line">
+            <a:avLst/>
+          </a:prstGeom>
+        </p:spPr>
+        <p:style>
+          <a:lnRef idx="1">
+            <a:schemeClr val="accent1"/>
+          </a:lnRef>
+          <a:fillRef idx="0">
+            <a:schemeClr val="accent1"/>
+          </a:fillRef>
+          <a:effectRef idx="0">
+            <a:schemeClr val="accent1"/>
+          </a:effectRef>
+          <a:fontRef idx="minor">
+            <a:schemeClr val="tx1"/>
+          </a:fontRef>
+        </p:style>
+      </p:cxnSp>
+      <p:cxnSp>
+        <p:nvCxnSpPr>
+          <p:cNvPr id="14" name="Straight Connector 13"/>
+          <p:cNvCxnSpPr/>
+          <p:nvPr/>
+        </p:nvCxnSpPr>
+        <p:spPr>
+          <a:xfrm flipH="1">
+            <a:off x="4513886" y="4439821"/>
+            <a:ext cx="1774234" cy="424069"/>
+          </a:xfrm>
+          <a:prstGeom prst="line">
+            <a:avLst/>
+          </a:prstGeom>
+        </p:spPr>
+        <p:style>
+          <a:lnRef idx="1">
+            <a:schemeClr val="accent1"/>
+          </a:lnRef>
+          <a:fillRef idx="0">
+            <a:schemeClr val="accent1"/>
+          </a:fillRef>
+          <a:effectRef idx="0">
+            <a:schemeClr val="accent1"/>
+          </a:effectRef>
+          <a:fontRef idx="minor">
+            <a:schemeClr val="tx1"/>
+          </a:fontRef>
+        </p:style>
+      </p:cxnSp>
+      <p:sp>
+        <p:nvSpPr>
+          <p:cNvPr id="15" name="TextBox 14"/>
+          <p:cNvSpPr txBox="1"/>
+          <p:nvPr/>
+        </p:nvSpPr>
+        <p:spPr>
+          <a:xfrm>
+            <a:off x="6520070" y="3790122"/>
+            <a:ext cx="466794" cy="369332"/>
+          </a:xfrm>
+          <a:prstGeom prst="rect">
+            <a:avLst/>
+          </a:prstGeom>
+          <a:noFill/>
+        </p:spPr>
+        <p:txBody>
+          <a:bodyPr wrap="none" rtlCol="0">
+            <a:spAutoFit/>
+          </a:bodyPr>
+          <a:lstStyle/>
+          <a:p>
+            <a:r>
+              <a:rPr lang="en-NZ" dirty="0" smtClean="0"/>
+              <a:t>w0</a:t>
+            </a:r>
+            <a:endParaRPr lang="en-NZ" dirty="0"/>
+          </a:p>
+        </p:txBody>
+      </p:sp>
+      <p:sp>
+        <p:nvSpPr>
+          <p:cNvPr id="16" name="TextBox 15"/>
+          <p:cNvSpPr txBox="1"/>
+          <p:nvPr/>
+        </p:nvSpPr>
+        <p:spPr>
+          <a:xfrm>
+            <a:off x="5355979" y="3806895"/>
+            <a:ext cx="466794" cy="369332"/>
+          </a:xfrm>
+          <a:prstGeom prst="rect">
+            <a:avLst/>
+          </a:prstGeom>
+          <a:noFill/>
+        </p:spPr>
+        <p:txBody>
+          <a:bodyPr wrap="none" rtlCol="0">
+            <a:spAutoFit/>
+          </a:bodyPr>
+          <a:lstStyle/>
+          <a:p>
+            <a:r>
+              <a:rPr lang="en-NZ" dirty="0" smtClean="0"/>
+              <a:t>w1</a:t>
+            </a:r>
+            <a:endParaRPr lang="en-NZ" dirty="0"/>
+          </a:p>
+        </p:txBody>
+      </p:sp>
+      <p:sp>
+        <p:nvSpPr>
+          <p:cNvPr id="17" name="Rectangle 16"/>
+          <p:cNvSpPr/>
+          <p:nvPr/>
+        </p:nvSpPr>
+        <p:spPr>
+          <a:xfrm>
+            <a:off x="6329397" y="4493497"/>
+            <a:ext cx="466794" cy="369332"/>
+          </a:xfrm>
+          <a:prstGeom prst="rect">
+            <a:avLst/>
+          </a:prstGeom>
+        </p:spPr>
+        <p:txBody>
+          <a:bodyPr wrap="none">
+            <a:spAutoFit/>
+          </a:bodyPr>
+          <a:lstStyle/>
+          <a:p>
+            <a:r>
+              <a:rPr lang="en-NZ" dirty="0" smtClean="0"/>
+              <a:t>w2</a:t>
+            </a:r>
+            <a:endParaRPr lang="en-NZ" dirty="0"/>
+          </a:p>
+        </p:txBody>
+      </p:sp>
+    </p:spTree>
+    <p:extLst>
+      <p:ext uri="{BB962C8B-B14F-4D97-AF65-F5344CB8AC3E}">
+        <p14:creationId xmlns:p14="http://schemas.microsoft.com/office/powerpoint/2010/main" val="2616922030"/>
       </p:ext>
     </p:extLst>
   </p:cSld>

</xml_diff>